<commit_message>
updated poster, added graphs
</commit_message>
<xml_diff>
--- a/poster/AerotaxisPoster.pptx
+++ b/poster/AerotaxisPoster.pptx
@@ -231,7 +231,7 @@
               <a:pPr>
                 <a:defRPr/>
               </a:pPr>
-              <a:t>5/13/2013</a:t>
+              <a:t>5/13/13</a:t>
             </a:fld>
             <a:endParaRPr lang="en-US"/>
           </a:p>
@@ -580,7 +580,7 @@
             <a:tailEnd/>
           </a:ln>
           <a:extLst>
-            <a:ext uri="{909E8E84-426E-40DD-AFC4-6F175D3DCCD1}">
+            <a:ext uri="{909E8E84-426E-40dd-AFC4-6F175D3DCCD1}">
               <a14:hiddenFill xmlns:a14="http://schemas.microsoft.com/office/drawing/2010/main">
                 <a:solidFill>
                   <a:srgbClr val="FFFFFF"/>
@@ -603,14 +603,14 @@
         <p:spPr bwMode="auto">
           <a:noFill/>
           <a:extLst>
-            <a:ext uri="{909E8E84-426E-40DD-AFC4-6F175D3DCCD1}">
+            <a:ext uri="{909E8E84-426E-40dd-AFC4-6F175D3DCCD1}">
               <a14:hiddenFill xmlns:a14="http://schemas.microsoft.com/office/drawing/2010/main">
                 <a:solidFill>
                   <a:srgbClr val="FFFFFF"/>
                 </a:solidFill>
               </a14:hiddenFill>
             </a:ext>
-            <a:ext uri="{91240B29-F687-4F45-9708-019B960494DF}">
+            <a:ext uri="{91240B29-F687-4f45-9708-019B960494DF}">
               <a14:hiddenLine xmlns:a14="http://schemas.microsoft.com/office/drawing/2010/main" w="9525">
                 <a:solidFill>
                   <a:srgbClr val="000000"/>
@@ -652,14 +652,14 @@
         <p:spPr bwMode="auto">
           <a:noFill/>
           <a:extLst>
-            <a:ext uri="{909E8E84-426E-40DD-AFC4-6F175D3DCCD1}">
+            <a:ext uri="{909E8E84-426E-40dd-AFC4-6F175D3DCCD1}">
               <a14:hiddenFill xmlns:a14="http://schemas.microsoft.com/office/drawing/2010/main">
                 <a:solidFill>
                   <a:srgbClr val="FFFFFF"/>
                 </a:solidFill>
               </a14:hiddenFill>
             </a:ext>
-            <a:ext uri="{91240B29-F687-4F45-9708-019B960494DF}">
+            <a:ext uri="{91240B29-F687-4f45-9708-019B960494DF}">
               <a14:hiddenLine xmlns:a14="http://schemas.microsoft.com/office/drawing/2010/main" w="9525">
                 <a:solidFill>
                   <a:srgbClr val="000000"/>
@@ -3811,14 +3811,14 @@
             <a:noFill/>
           </a:ln>
           <a:extLst>
-            <a:ext uri="{909E8E84-426E-40DD-AFC4-6F175D3DCCD1}">
+            <a:ext uri="{909E8E84-426E-40dd-AFC4-6F175D3DCCD1}">
               <a14:hiddenFill xmlns:a14="http://schemas.microsoft.com/office/drawing/2010/main">
                 <a:solidFill>
                   <a:srgbClr val="FFFFFF"/>
                 </a:solidFill>
               </a14:hiddenFill>
             </a:ext>
-            <a:ext uri="{91240B29-F687-4F45-9708-019B960494DF}">
+            <a:ext uri="{91240B29-F687-4f45-9708-019B960494DF}">
               <a14:hiddenLine xmlns:a14="http://schemas.microsoft.com/office/drawing/2010/main" w="9525">
                 <a:solidFill>
                   <a:srgbClr val="000000"/>
@@ -3869,14 +3869,14 @@
             <a:noFill/>
           </a:ln>
           <a:extLst>
-            <a:ext uri="{909E8E84-426E-40DD-AFC4-6F175D3DCCD1}">
+            <a:ext uri="{909E8E84-426E-40dd-AFC4-6F175D3DCCD1}">
               <a14:hiddenFill xmlns:a14="http://schemas.microsoft.com/office/drawing/2010/main">
                 <a:solidFill>
                   <a:srgbClr val="FFFFFF"/>
                 </a:solidFill>
               </a14:hiddenFill>
             </a:ext>
-            <a:ext uri="{91240B29-F687-4F45-9708-019B960494DF}">
+            <a:ext uri="{91240B29-F687-4f45-9708-019B960494DF}">
               <a14:hiddenLine xmlns:a14="http://schemas.microsoft.com/office/drawing/2010/main" w="9525">
                 <a:solidFill>
                   <a:srgbClr val="000000"/>
@@ -4581,14 +4581,14 @@
             <a:noFill/>
           </a:ln>
           <a:extLst>
-            <a:ext uri="{909E8E84-426E-40DD-AFC4-6F175D3DCCD1}">
+            <a:ext uri="{909E8E84-426E-40dd-AFC4-6F175D3DCCD1}">
               <a14:hiddenFill xmlns:a14="http://schemas.microsoft.com/office/drawing/2010/main">
                 <a:solidFill>
                   <a:srgbClr val="FFFFFF"/>
                 </a:solidFill>
               </a14:hiddenFill>
             </a:ext>
-            <a:ext uri="{91240B29-F687-4F45-9708-019B960494DF}">
+            <a:ext uri="{91240B29-F687-4f45-9708-019B960494DF}">
               <a14:hiddenLine xmlns:a14="http://schemas.microsoft.com/office/drawing/2010/main" w="76200">
                 <a:solidFill>
                   <a:srgbClr val="000000"/>
@@ -4939,14 +4939,14 @@
             <a:noFill/>
           </a:ln>
           <a:extLst>
-            <a:ext uri="{909E8E84-426E-40DD-AFC4-6F175D3DCCD1}">
+            <a:ext uri="{909E8E84-426E-40dd-AFC4-6F175D3DCCD1}">
               <a14:hiddenFill xmlns:a14="http://schemas.microsoft.com/office/drawing/2010/main">
                 <a:solidFill>
                   <a:srgbClr val="FFFFFF"/>
                 </a:solidFill>
               </a14:hiddenFill>
             </a:ext>
-            <a:ext uri="{91240B29-F687-4F45-9708-019B960494DF}">
+            <a:ext uri="{91240B29-F687-4f45-9708-019B960494DF}">
               <a14:hiddenLine xmlns:a14="http://schemas.microsoft.com/office/drawing/2010/main" w="12700">
                 <a:solidFill>
                   <a:srgbClr val="000000"/>
@@ -5141,48 +5141,29 @@
                 <a:ea typeface="Segoe UI" pitchFamily="34" charset="0"/>
                 <a:cs typeface="Segoe UI" pitchFamily="34" charset="0"/>
               </a:rPr>
-              <a:t>to a gradient of nitrogen and oxygen can be characterized. (sentence: numerical results for gradient or movement, etc.) The movement of </a:t>
-            </a:r>
-            <a:r>
-              <a:rPr lang="en-US" sz="2800" i="1" dirty="0">
+              <a:t>to a gradient of nitrogen and oxygen can be </a:t>
+            </a:r>
+            <a:r>
+              <a:rPr lang="en-US" sz="2800" dirty="0" smtClean="0">
                 <a:latin typeface="Segoe UI" pitchFamily="34" charset="0"/>
                 <a:ea typeface="Segoe UI" pitchFamily="34" charset="0"/>
                 <a:cs typeface="Segoe UI" pitchFamily="34" charset="0"/>
               </a:rPr>
-              <a:t>B. </a:t>
-            </a:r>
-            <a:r>
-              <a:rPr lang="en-US" sz="2800" i="1" dirty="0" err="1">
+              <a:t>observed, </a:t>
+            </a:r>
+            <a:r>
+              <a:rPr lang="en-US" sz="2800" dirty="0" smtClean="0">
                 <a:latin typeface="Segoe UI" pitchFamily="34" charset="0"/>
                 <a:ea typeface="Segoe UI" pitchFamily="34" charset="0"/>
                 <a:cs typeface="Segoe UI" pitchFamily="34" charset="0"/>
               </a:rPr>
-              <a:t>subtilis</a:t>
-            </a:r>
-            <a:r>
-              <a:rPr lang="en-US" sz="2800" dirty="0">
-                <a:latin typeface="Segoe UI" pitchFamily="34" charset="0"/>
-                <a:ea typeface="Segoe UI" pitchFamily="34" charset="0"/>
-                <a:cs typeface="Segoe UI" pitchFamily="34" charset="0"/>
-              </a:rPr>
-              <a:t> tends towards oxygen and away from nitrogen, demonstrating an </a:t>
-            </a:r>
-            <a:r>
-              <a:rPr lang="en-US" sz="2800" dirty="0" err="1">
-                <a:latin typeface="Segoe UI" pitchFamily="34" charset="0"/>
-                <a:ea typeface="Segoe UI" pitchFamily="34" charset="0"/>
-                <a:cs typeface="Segoe UI" pitchFamily="34" charset="0"/>
-              </a:rPr>
-              <a:t>aerotactic</a:t>
-            </a:r>
-            <a:r>
-              <a:rPr lang="en-US" sz="2800" dirty="0">
-                <a:latin typeface="Segoe UI" pitchFamily="34" charset="0"/>
-                <a:ea typeface="Segoe UI" pitchFamily="34" charset="0"/>
-                <a:cs typeface="Segoe UI" pitchFamily="34" charset="0"/>
-              </a:rPr>
-              <a:t> response. </a:t>
-            </a:r>
+              <a:t>through changes in population density. Quantitative analysis of bacterial motion was attempted, but inconclusive due to a high degree of random-walk like behavior.</a:t>
+            </a:r>
+            <a:endParaRPr lang="en-US" sz="2800" dirty="0">
+              <a:latin typeface="Segoe UI" pitchFamily="34" charset="0"/>
+              <a:ea typeface="Segoe UI" pitchFamily="34" charset="0"/>
+              <a:cs typeface="Segoe UI" pitchFamily="34" charset="0"/>
+            </a:endParaRPr>
           </a:p>
         </p:txBody>
       </p:sp>
@@ -5256,14 +5237,14 @@
             <a:noFill/>
           </a:ln>
           <a:extLst>
-            <a:ext uri="{909E8E84-426E-40DD-AFC4-6F175D3DCCD1}">
+            <a:ext uri="{909E8E84-426E-40dd-AFC4-6F175D3DCCD1}">
               <a14:hiddenFill xmlns:a14="http://schemas.microsoft.com/office/drawing/2010/main">
                 <a:solidFill>
                   <a:srgbClr val="FFFFFF"/>
                 </a:solidFill>
               </a14:hiddenFill>
             </a:ext>
-            <a:ext uri="{91240B29-F687-4F45-9708-019B960494DF}">
+            <a:ext uri="{91240B29-F687-4f45-9708-019B960494DF}">
               <a14:hiddenLine xmlns:a14="http://schemas.microsoft.com/office/drawing/2010/main" w="9525">
                 <a:solidFill>
                   <a:srgbClr val="000000"/>
@@ -5310,14 +5291,14 @@
             <a:noFill/>
           </a:ln>
           <a:extLst>
-            <a:ext uri="{909E8E84-426E-40DD-AFC4-6F175D3DCCD1}">
+            <a:ext uri="{909E8E84-426E-40dd-AFC4-6F175D3DCCD1}">
               <a14:hiddenFill xmlns:a14="http://schemas.microsoft.com/office/drawing/2010/main">
                 <a:solidFill>
                   <a:srgbClr val="FFFFFF"/>
                 </a:solidFill>
               </a14:hiddenFill>
             </a:ext>
-            <a:ext uri="{91240B29-F687-4F45-9708-019B960494DF}">
+            <a:ext uri="{91240B29-F687-4f45-9708-019B960494DF}">
               <a14:hiddenLine xmlns:a14="http://schemas.microsoft.com/office/drawing/2010/main" w="9525">
                 <a:solidFill>
                   <a:srgbClr val="000000"/>
@@ -5421,14 +5402,14 @@
             <a:noFill/>
           </a:ln>
           <a:extLst>
-            <a:ext uri="{909E8E84-426E-40DD-AFC4-6F175D3DCCD1}">
+            <a:ext uri="{909E8E84-426E-40dd-AFC4-6F175D3DCCD1}">
               <a14:hiddenFill xmlns:a14="http://schemas.microsoft.com/office/drawing/2010/main">
                 <a:solidFill>
                   <a:srgbClr val="FFFFFF"/>
                 </a:solidFill>
               </a14:hiddenFill>
             </a:ext>
-            <a:ext uri="{91240B29-F687-4F45-9708-019B960494DF}">
+            <a:ext uri="{91240B29-F687-4f45-9708-019B960494DF}">
               <a14:hiddenLine xmlns:a14="http://schemas.microsoft.com/office/drawing/2010/main" w="9525">
                 <a:solidFill>
                   <a:srgbClr val="000000"/>
@@ -5687,14 +5668,14 @@
             <a:noFill/>
           </a:ln>
           <a:extLst>
-            <a:ext uri="{909E8E84-426E-40DD-AFC4-6F175D3DCCD1}">
+            <a:ext uri="{909E8E84-426E-40dd-AFC4-6F175D3DCCD1}">
               <a14:hiddenFill xmlns:a14="http://schemas.microsoft.com/office/drawing/2010/main">
                 <a:solidFill>
                   <a:srgbClr val="FFFFFF"/>
                 </a:solidFill>
               </a14:hiddenFill>
             </a:ext>
-            <a:ext uri="{91240B29-F687-4F45-9708-019B960494DF}">
+            <a:ext uri="{91240B29-F687-4f45-9708-019B960494DF}">
               <a14:hiddenLine xmlns:a14="http://schemas.microsoft.com/office/drawing/2010/main" w="12700">
                 <a:solidFill>
                   <a:srgbClr val="000000"/>
@@ -5868,14 +5849,14 @@
             <a:noFill/>
           </a:ln>
           <a:extLst>
-            <a:ext uri="{909E8E84-426E-40DD-AFC4-6F175D3DCCD1}">
+            <a:ext uri="{909E8E84-426E-40dd-AFC4-6F175D3DCCD1}">
               <a14:hiddenFill xmlns:a14="http://schemas.microsoft.com/office/drawing/2010/main">
                 <a:solidFill>
                   <a:srgbClr val="FFFFFF"/>
                 </a:solidFill>
               </a14:hiddenFill>
             </a:ext>
-            <a:ext uri="{91240B29-F687-4F45-9708-019B960494DF}">
+            <a:ext uri="{91240B29-F687-4f45-9708-019B960494DF}">
               <a14:hiddenLine xmlns:a14="http://schemas.microsoft.com/office/drawing/2010/main" w="12700">
                 <a:solidFill>
                   <a:srgbClr val="000000"/>
@@ -6139,14 +6120,14 @@
             <a:noFill/>
           </a:ln>
           <a:extLst>
-            <a:ext uri="{909E8E84-426E-40DD-AFC4-6F175D3DCCD1}">
+            <a:ext uri="{909E8E84-426E-40dd-AFC4-6F175D3DCCD1}">
               <a14:hiddenFill xmlns:a14="http://schemas.microsoft.com/office/drawing/2010/main">
                 <a:solidFill>
                   <a:srgbClr val="FFFFFF"/>
                 </a:solidFill>
               </a14:hiddenFill>
             </a:ext>
-            <a:ext uri="{91240B29-F687-4F45-9708-019B960494DF}">
+            <a:ext uri="{91240B29-F687-4f45-9708-019B960494DF}">
               <a14:hiddenLine xmlns:a14="http://schemas.microsoft.com/office/drawing/2010/main" w="12700">
                 <a:solidFill>
                   <a:srgbClr val="000000"/>
@@ -6356,14 +6337,14 @@
             <a:noFill/>
           </a:ln>
           <a:extLst>
-            <a:ext uri="{909E8E84-426E-40DD-AFC4-6F175D3DCCD1}">
+            <a:ext uri="{909E8E84-426E-40dd-AFC4-6F175D3DCCD1}">
               <a14:hiddenFill xmlns:a14="http://schemas.microsoft.com/office/drawing/2010/main">
                 <a:solidFill>
                   <a:srgbClr val="FFFFFF"/>
                 </a:solidFill>
               </a14:hiddenFill>
             </a:ext>
-            <a:ext uri="{91240B29-F687-4F45-9708-019B960494DF}">
+            <a:ext uri="{91240B29-F687-4f45-9708-019B960494DF}">
               <a14:hiddenLine xmlns:a14="http://schemas.microsoft.com/office/drawing/2010/main" w="12700">
                 <a:solidFill>
                   <a:srgbClr val="000000"/>
@@ -6537,14 +6518,14 @@
             <a:noFill/>
           </a:ln>
           <a:extLst>
-            <a:ext uri="{909E8E84-426E-40DD-AFC4-6F175D3DCCD1}">
+            <a:ext uri="{909E8E84-426E-40dd-AFC4-6F175D3DCCD1}">
               <a14:hiddenFill xmlns:a14="http://schemas.microsoft.com/office/drawing/2010/main">
                 <a:solidFill>
                   <a:srgbClr val="FFFFFF"/>
                 </a:solidFill>
               </a14:hiddenFill>
             </a:ext>
-            <a:ext uri="{91240B29-F687-4F45-9708-019B960494DF}">
+            <a:ext uri="{91240B29-F687-4f45-9708-019B960494DF}">
               <a14:hiddenLine xmlns:a14="http://schemas.microsoft.com/office/drawing/2010/main" w="9525">
                 <a:solidFill>
                   <a:srgbClr val="000000"/>
@@ -6586,7 +6567,7 @@
           </a:prstGeom>
           <a:noFill/>
           <a:extLst>
-            <a:ext uri="{909E8E84-426E-40DD-AFC4-6F175D3DCCD1}">
+            <a:ext uri="{909E8E84-426E-40dd-AFC4-6F175D3DCCD1}">
               <a14:hiddenFill xmlns:a14="http://schemas.microsoft.com/office/drawing/2010/main">
                 <a:solidFill>
                   <a:srgbClr val="FFFFFF"/>
@@ -6767,39 +6748,7 @@
                 <a:ea typeface="Segoe UI" pitchFamily="34" charset="0"/>
                 <a:cs typeface="Segoe UI" pitchFamily="34" charset="0"/>
               </a:rPr>
-              <a:t> gases each flow through a primary </a:t>
-            </a:r>
-            <a:r>
-              <a:rPr lang="en-US" sz="2400" dirty="0" smtClean="0">
-                <a:latin typeface="Segoe UI" pitchFamily="34" charset="0"/>
-                <a:ea typeface="Segoe UI" pitchFamily="34" charset="0"/>
-                <a:cs typeface="Segoe UI" pitchFamily="34" charset="0"/>
-              </a:rPr>
-              <a:t>regulator and </a:t>
-            </a:r>
-            <a:r>
-              <a:rPr lang="en-US" sz="2400" dirty="0" smtClean="0">
-                <a:latin typeface="Segoe UI" pitchFamily="34" charset="0"/>
-                <a:ea typeface="Segoe UI" pitchFamily="34" charset="0"/>
-                <a:cs typeface="Segoe UI" pitchFamily="34" charset="0"/>
-              </a:rPr>
-              <a:t>a secondary regulator, dropping </a:t>
-            </a:r>
-            <a:r>
-              <a:rPr lang="en-US" sz="2400" dirty="0" smtClean="0">
-                <a:latin typeface="Segoe UI" pitchFamily="34" charset="0"/>
-                <a:ea typeface="Segoe UI" pitchFamily="34" charset="0"/>
-                <a:cs typeface="Segoe UI" pitchFamily="34" charset="0"/>
-              </a:rPr>
-              <a:t>their </a:t>
-            </a:r>
-            <a:r>
-              <a:rPr lang="en-US" sz="2400" dirty="0" smtClean="0">
-                <a:latin typeface="Segoe UI" pitchFamily="34" charset="0"/>
-                <a:ea typeface="Segoe UI" pitchFamily="34" charset="0"/>
-                <a:cs typeface="Segoe UI" pitchFamily="34" charset="0"/>
-              </a:rPr>
-              <a:t>pressure to 2 psi before they enter the device through 0.050” OD syringe tips.</a:t>
+              <a:t> gases each flow through a primary regulator and a secondary regulator, dropping their pressure to 2 psi before they enter the device through 0.050” OD syringe tips.</a:t>
             </a:r>
             <a:endParaRPr lang="en-US" sz="2400" dirty="0">
               <a:latin typeface="Segoe UI" pitchFamily="34" charset="0"/>
@@ -6909,9 +6858,198 @@
           <a:effectLst/>
         </p:spPr>
       </p:cxnSp>
-      <p:sp>
-        <p:nvSpPr>
-          <p:cNvPr id="28" name="Text Box 11"/>
+      <p:pic>
+        <p:nvPicPr>
+          <p:cNvPr id="5" name="Picture 4" descr="tracks_1.png"/>
+          <p:cNvPicPr>
+            <a:picLocks noChangeAspect="1"/>
+          </p:cNvPicPr>
+          <p:nvPr/>
+        </p:nvPicPr>
+        <p:blipFill>
+          <a:blip r:embed="rId7">
+            <a:extLst>
+              <a:ext uri="{28A0092B-C50C-407E-A947-70E740481C1C}">
+                <a14:useLocalDpi xmlns:a14="http://schemas.microsoft.com/office/drawing/2010/main" val="0"/>
+              </a:ext>
+            </a:extLst>
+          </a:blip>
+          <a:stretch>
+            <a:fillRect/>
+          </a:stretch>
+        </p:blipFill>
+        <p:spPr>
+          <a:xfrm>
+            <a:off x="28071135" y="3914565"/>
+            <a:ext cx="4174225" cy="2766232"/>
+          </a:xfrm>
+          <a:prstGeom prst="rect">
+            <a:avLst/>
+          </a:prstGeom>
+        </p:spPr>
+      </p:pic>
+      <p:pic>
+        <p:nvPicPr>
+          <p:cNvPr id="8" name="Picture 7" descr="tracks_2.png"/>
+          <p:cNvPicPr>
+            <a:picLocks noChangeAspect="1"/>
+          </p:cNvPicPr>
+          <p:nvPr/>
+        </p:nvPicPr>
+        <p:blipFill>
+          <a:blip r:embed="rId8">
+            <a:extLst>
+              <a:ext uri="{28A0092B-C50C-407E-A947-70E740481C1C}">
+                <a14:useLocalDpi xmlns:a14="http://schemas.microsoft.com/office/drawing/2010/main" val="0"/>
+              </a:ext>
+            </a:extLst>
+          </a:blip>
+          <a:stretch>
+            <a:fillRect/>
+          </a:stretch>
+        </p:blipFill>
+        <p:spPr>
+          <a:xfrm>
+            <a:off x="28071135" y="7329840"/>
+            <a:ext cx="4022435" cy="2798465"/>
+          </a:xfrm>
+          <a:prstGeom prst="rect">
+            <a:avLst/>
+          </a:prstGeom>
+        </p:spPr>
+      </p:pic>
+      <p:pic>
+        <p:nvPicPr>
+          <p:cNvPr id="9" name="Picture 8" descr="tracks_3.png"/>
+          <p:cNvPicPr>
+            <a:picLocks noChangeAspect="1"/>
+          </p:cNvPicPr>
+          <p:nvPr/>
+        </p:nvPicPr>
+        <p:blipFill>
+          <a:blip r:embed="rId9">
+            <a:extLst>
+              <a:ext uri="{28A0092B-C50C-407E-A947-70E740481C1C}">
+                <a14:useLocalDpi xmlns:a14="http://schemas.microsoft.com/office/drawing/2010/main" val="0"/>
+              </a:ext>
+            </a:extLst>
+          </a:blip>
+          <a:stretch>
+            <a:fillRect/>
+          </a:stretch>
+        </p:blipFill>
+        <p:spPr>
+          <a:xfrm>
+            <a:off x="28071135" y="10745115"/>
+            <a:ext cx="4326015" cy="2826098"/>
+          </a:xfrm>
+          <a:prstGeom prst="rect">
+            <a:avLst/>
+          </a:prstGeom>
+        </p:spPr>
+      </p:pic>
+      <p:sp>
+        <p:nvSpPr>
+          <p:cNvPr id="34" name="TextBox 33"/>
+          <p:cNvSpPr txBox="1"/>
+          <p:nvPr/>
+        </p:nvSpPr>
+        <p:spPr>
+          <a:xfrm>
+            <a:off x="28602400" y="6798575"/>
+            <a:ext cx="3567065" cy="461665"/>
+          </a:xfrm>
+          <a:prstGeom prst="rect">
+            <a:avLst/>
+          </a:prstGeom>
+          <a:noFill/>
+        </p:spPr>
+        <p:txBody>
+          <a:bodyPr wrap="square" rtlCol="0">
+            <a:spAutoFit/>
+          </a:bodyPr>
+          <a:lstStyle/>
+          <a:p>
+            <a:pPr algn="ctr"/>
+            <a:r>
+              <a:rPr lang="en-US" sz="2400" dirty="0" smtClean="0">
+                <a:latin typeface="Segoe UI" pitchFamily="34" charset="0"/>
+                <a:ea typeface="Segoe UI" pitchFamily="34" charset="0"/>
+                <a:cs typeface="Segoe UI" pitchFamily="34" charset="0"/>
+              </a:rPr>
+              <a:t>Prior to oxygen flow</a:t>
+            </a:r>
+            <a:endParaRPr lang="en-US" sz="2400" dirty="0">
+              <a:latin typeface="Segoe UI" pitchFamily="34" charset="0"/>
+              <a:ea typeface="Segoe UI" pitchFamily="34" charset="0"/>
+              <a:cs typeface="Segoe UI" pitchFamily="34" charset="0"/>
+            </a:endParaRPr>
+          </a:p>
+        </p:txBody>
+      </p:sp>
+      <p:pic>
+        <p:nvPicPr>
+          <p:cNvPr id="11" name="Picture 10" descr="norm_count.png"/>
+          <p:cNvPicPr>
+            <a:picLocks noChangeAspect="1"/>
+          </p:cNvPicPr>
+          <p:nvPr/>
+        </p:nvPicPr>
+        <p:blipFill>
+          <a:blip r:embed="rId10">
+            <a:extLst>
+              <a:ext uri="{28A0092B-C50C-407E-A947-70E740481C1C}">
+                <a14:useLocalDpi xmlns:a14="http://schemas.microsoft.com/office/drawing/2010/main" val="0"/>
+              </a:ext>
+            </a:extLst>
+          </a:blip>
+          <a:stretch>
+            <a:fillRect/>
+          </a:stretch>
+        </p:blipFill>
+        <p:spPr>
+          <a:xfrm>
+            <a:off x="16079725" y="3838670"/>
+            <a:ext cx="7900172" cy="5568658"/>
+          </a:xfrm>
+          <a:prstGeom prst="rect">
+            <a:avLst/>
+          </a:prstGeom>
+        </p:spPr>
+      </p:pic>
+      <p:pic>
+        <p:nvPicPr>
+          <p:cNvPr id="12" name="Picture 11" descr="good_plot.png"/>
+          <p:cNvPicPr>
+            <a:picLocks noChangeAspect="1"/>
+          </p:cNvPicPr>
+          <p:nvPr/>
+        </p:nvPicPr>
+        <p:blipFill>
+          <a:blip r:embed="rId11">
+            <a:extLst>
+              <a:ext uri="{28A0092B-C50C-407E-A947-70E740481C1C}">
+                <a14:useLocalDpi xmlns:a14="http://schemas.microsoft.com/office/drawing/2010/main" val="0"/>
+              </a:ext>
+            </a:extLst>
+          </a:blip>
+          <a:stretch>
+            <a:fillRect/>
+          </a:stretch>
+        </p:blipFill>
+        <p:spPr>
+          <a:xfrm>
+            <a:off x="15927935" y="9288584"/>
+            <a:ext cx="7919642" cy="4947701"/>
+          </a:xfrm>
+          <a:prstGeom prst="rect">
+            <a:avLst/>
+          </a:prstGeom>
+        </p:spPr>
+      </p:pic>
+      <p:sp>
+        <p:nvSpPr>
+          <p:cNvPr id="38" name="Text Box 11"/>
           <p:cNvSpPr txBox="1">
             <a:spLocks noChangeArrowheads="1"/>
           </p:cNvSpPr>
@@ -6919,8 +7057,8 @@
         </p:nvSpPr>
         <p:spPr bwMode="auto">
           <a:xfrm>
-            <a:off x="16155619" y="3762376"/>
-            <a:ext cx="16023912" cy="747431"/>
+            <a:off x="597145" y="16057765"/>
+            <a:ext cx="14767410" cy="747431"/>
           </a:xfrm>
           <a:prstGeom prst="rect">
             <a:avLst/>
@@ -6930,14 +7068,14 @@
             <a:noFill/>
           </a:ln>
           <a:extLst>
-            <a:ext uri="{909E8E84-426E-40DD-AFC4-6F175D3DCCD1}">
+            <a:ext uri="{909E8E84-426E-40dd-AFC4-6F175D3DCCD1}">
               <a14:hiddenFill xmlns:a14="http://schemas.microsoft.com/office/drawing/2010/main">
                 <a:solidFill>
                   <a:srgbClr val="FFFFFF"/>
                 </a:solidFill>
               </a14:hiddenFill>
             </a:ext>
-            <a:ext uri="{91240B29-F687-4F45-9708-019B960494DF}">
+            <a:ext uri="{91240B29-F687-4f45-9708-019B960494DF}">
               <a14:hiddenLine xmlns:a14="http://schemas.microsoft.com/office/drawing/2010/main" w="12700">
                 <a:solidFill>
                   <a:srgbClr val="000000"/>
@@ -7068,13 +7206,97 @@
             </a:pPr>
             <a:r>
               <a:rPr lang="en-US" sz="2800" dirty="0" smtClean="0">
+                <a:solidFill>
+                  <a:srgbClr val="FF0000"/>
+                </a:solidFill>
                 <a:latin typeface="Segoe UI" pitchFamily="34" charset="0"/>
                 <a:ea typeface="Segoe UI" pitchFamily="34" charset="0"/>
                 <a:cs typeface="Segoe UI" pitchFamily="34" charset="0"/>
               </a:rPr>
-              <a:t>Results!</a:t>
+              <a:t>NEEDS INFO ABOUT MICROFLUIDIC DEVICE. NEEDS INFO ABOUT BACTERIA</a:t>
             </a:r>
             <a:endParaRPr lang="en-US" sz="2800" dirty="0">
+              <a:solidFill>
+                <a:srgbClr val="FF0000"/>
+              </a:solidFill>
+              <a:latin typeface="Segoe UI" pitchFamily="34" charset="0"/>
+              <a:ea typeface="Segoe UI" pitchFamily="34" charset="0"/>
+              <a:cs typeface="Segoe UI" pitchFamily="34" charset="0"/>
+            </a:endParaRPr>
+          </a:p>
+        </p:txBody>
+      </p:sp>
+      <p:sp>
+        <p:nvSpPr>
+          <p:cNvPr id="39" name="TextBox 38"/>
+          <p:cNvSpPr txBox="1"/>
+          <p:nvPr/>
+        </p:nvSpPr>
+        <p:spPr>
+          <a:xfrm>
+            <a:off x="28526505" y="10062060"/>
+            <a:ext cx="3567065" cy="461665"/>
+          </a:xfrm>
+          <a:prstGeom prst="rect">
+            <a:avLst/>
+          </a:prstGeom>
+          <a:noFill/>
+        </p:spPr>
+        <p:txBody>
+          <a:bodyPr wrap="square" rtlCol="0">
+            <a:spAutoFit/>
+          </a:bodyPr>
+          <a:lstStyle/>
+          <a:p>
+            <a:pPr algn="ctr"/>
+            <a:r>
+              <a:rPr lang="en-US" sz="2400" dirty="0" smtClean="0">
+                <a:latin typeface="Segoe UI" pitchFamily="34" charset="0"/>
+                <a:ea typeface="Segoe UI" pitchFamily="34" charset="0"/>
+                <a:cs typeface="Segoe UI" pitchFamily="34" charset="0"/>
+              </a:rPr>
+              <a:t>+1 minute</a:t>
+            </a:r>
+            <a:endParaRPr lang="en-US" sz="2400" dirty="0">
+              <a:latin typeface="Segoe UI" pitchFamily="34" charset="0"/>
+              <a:ea typeface="Segoe UI" pitchFamily="34" charset="0"/>
+              <a:cs typeface="Segoe UI" pitchFamily="34" charset="0"/>
+            </a:endParaRPr>
+          </a:p>
+        </p:txBody>
+      </p:sp>
+      <p:sp>
+        <p:nvSpPr>
+          <p:cNvPr id="40" name="TextBox 39"/>
+          <p:cNvSpPr txBox="1"/>
+          <p:nvPr/>
+        </p:nvSpPr>
+        <p:spPr>
+          <a:xfrm>
+            <a:off x="28602400" y="13477335"/>
+            <a:ext cx="3567065" cy="461665"/>
+          </a:xfrm>
+          <a:prstGeom prst="rect">
+            <a:avLst/>
+          </a:prstGeom>
+          <a:noFill/>
+        </p:spPr>
+        <p:txBody>
+          <a:bodyPr wrap="square" rtlCol="0">
+            <a:spAutoFit/>
+          </a:bodyPr>
+          <a:lstStyle/>
+          <a:p>
+            <a:pPr algn="ctr"/>
+            <a:r>
+              <a:rPr lang="en-US" sz="2400" dirty="0" smtClean="0">
+                <a:latin typeface="Segoe UI" pitchFamily="34" charset="0"/>
+                <a:ea typeface="Segoe UI" pitchFamily="34" charset="0"/>
+                <a:cs typeface="Segoe UI" pitchFamily="34" charset="0"/>
+              </a:rPr>
+              <a:t>+3 minutes</a:t>
+            </a:r>
+            <a:endParaRPr lang="en-US" sz="2400" dirty="0">
               <a:latin typeface="Segoe UI" pitchFamily="34" charset="0"/>
               <a:ea typeface="Segoe UI" pitchFamily="34" charset="0"/>
               <a:cs typeface="Segoe UI" pitchFamily="34" charset="0"/>
@@ -7090,7 +7312,7 @@
   <p:timing>
     <p:tnLst>
       <p:par>
-        <p:cTn id="1" dur="indefinite" restart="never" nodeType="tmRoot"/>
+        <p:cTn xmlns:p14="http://schemas.microsoft.com/office/powerpoint/2010/main" id="1" dur="indefinite" restart="never" nodeType="tmRoot"/>
       </p:par>
     </p:tnLst>
   </p:timing>

</xml_diff>